<commit_message>
added RF to presentation
</commit_message>
<xml_diff>
--- a/ML-Project.pptx
+++ b/ML-Project.pptx
@@ -5,7 +5,7 @@
     <p:sldMasterId id="2147483660" r:id="rId1"/>
   </p:sldMasterIdLst>
   <p:notesMasterIdLst>
-    <p:notesMasterId r:id="rId17"/>
+    <p:notesMasterId r:id="rId21"/>
   </p:notesMasterIdLst>
   <p:sldIdLst>
     <p:sldId id="256" r:id="rId2"/>
@@ -21,8 +21,12 @@
     <p:sldId id="293" r:id="rId12"/>
     <p:sldId id="294" r:id="rId13"/>
     <p:sldId id="295" r:id="rId14"/>
-    <p:sldId id="281" r:id="rId15"/>
-    <p:sldId id="282" r:id="rId16"/>
+    <p:sldId id="296" r:id="rId15"/>
+    <p:sldId id="298" r:id="rId16"/>
+    <p:sldId id="297" r:id="rId17"/>
+    <p:sldId id="299" r:id="rId18"/>
+    <p:sldId id="281" r:id="rId19"/>
+    <p:sldId id="282" r:id="rId20"/>
   </p:sldIdLst>
   <p:sldSz cx="12192000" cy="6858000"/>
   <p:notesSz cx="6858000" cy="9144000"/>
@@ -143,6 +147,10 @@
             <p14:sldId id="293"/>
             <p14:sldId id="294"/>
             <p14:sldId id="295"/>
+            <p14:sldId id="296"/>
+            <p14:sldId id="298"/>
+            <p14:sldId id="297"/>
+            <p14:sldId id="299"/>
           </p14:sldIdLst>
         </p14:section>
         <p14:section name="Conclusion" id="{B5001B22-43B0-41A6-A184-B965F0D1F4DB}">
@@ -15221,6 +15229,1390 @@
           <p:cNvPr id="2" name="Title 1">
             <a:extLst>
               <a:ext uri="{FF2B5EF4-FFF2-40B4-BE49-F238E27FC236}">
+                <a16:creationId xmlns:a16="http://schemas.microsoft.com/office/drawing/2014/main" id="{EC059BB5-6D9A-265C-6244-AF85F808A3FE}"/>
+              </a:ext>
+            </a:extLst>
+          </p:cNvPr>
+          <p:cNvSpPr>
+            <a:spLocks noGrp="1"/>
+          </p:cNvSpPr>
+          <p:nvPr>
+            <p:ph type="title"/>
+          </p:nvPr>
+        </p:nvSpPr>
+        <p:spPr/>
+        <p:txBody>
+          <a:bodyPr/>
+          <a:lstStyle/>
+          <a:p>
+            <a:pPr algn="ctr"/>
+            <a:r>
+              <a:rPr lang="en-US" dirty="0"/>
+              <a:t>Random Forests - Number of trees</a:t>
+            </a:r>
+          </a:p>
+        </p:txBody>
+      </p:sp>
+      <p:sp>
+        <p:nvSpPr>
+          <p:cNvPr id="3" name="Slide Number Placeholder 2">
+            <a:extLst>
+              <a:ext uri="{FF2B5EF4-FFF2-40B4-BE49-F238E27FC236}">
+                <a16:creationId xmlns:a16="http://schemas.microsoft.com/office/drawing/2014/main" id="{8E1C06EB-7842-0C87-5068-F2089E2D9636}"/>
+              </a:ext>
+            </a:extLst>
+          </p:cNvPr>
+          <p:cNvSpPr>
+            <a:spLocks noGrp="1"/>
+          </p:cNvSpPr>
+          <p:nvPr>
+            <p:ph type="sldNum" sz="quarter" idx="12"/>
+          </p:nvPr>
+        </p:nvSpPr>
+        <p:spPr/>
+        <p:txBody>
+          <a:bodyPr/>
+          <a:lstStyle/>
+          <a:p>
+            <a:fld id="{73B850FF-6169-4056-8077-06FFA93A5366}" type="slidenum">
+              <a:rPr lang="en-US" smtClean="0"/>
+              <a:t>14</a:t>
+            </a:fld>
+            <a:endParaRPr lang="en-US"/>
+          </a:p>
+        </p:txBody>
+      </p:sp>
+      <p:pic>
+        <p:nvPicPr>
+          <p:cNvPr id="5" name="Picture 4" descr="A graph with a line graph&#10;&#10;Description automatically generated">
+            <a:extLst>
+              <a:ext uri="{FF2B5EF4-FFF2-40B4-BE49-F238E27FC236}">
+                <a16:creationId xmlns:a16="http://schemas.microsoft.com/office/drawing/2014/main" id="{A3799D50-4A72-6105-5547-9F2B999F765E}"/>
+              </a:ext>
+            </a:extLst>
+          </p:cNvPr>
+          <p:cNvPicPr>
+            <a:picLocks noChangeAspect="1"/>
+          </p:cNvPicPr>
+          <p:nvPr/>
+        </p:nvPicPr>
+        <p:blipFill>
+          <a:blip r:embed="rId2">
+            <a:extLst>
+              <a:ext uri="{28A0092B-C50C-407E-A947-70E740481C1C}">
+                <a14:useLocalDpi xmlns:a14="http://schemas.microsoft.com/office/drawing/2010/main" val="0"/>
+              </a:ext>
+            </a:extLst>
+          </a:blip>
+          <a:stretch>
+            <a:fillRect/>
+          </a:stretch>
+        </p:blipFill>
+        <p:spPr>
+          <a:xfrm>
+            <a:off x="113539" y="1509385"/>
+            <a:ext cx="7854712" cy="4983490"/>
+          </a:xfrm>
+          <a:prstGeom prst="rect">
+            <a:avLst/>
+          </a:prstGeom>
+        </p:spPr>
+      </p:pic>
+      <p:sp>
+        <p:nvSpPr>
+          <p:cNvPr id="6" name="Content Placeholder 4">
+            <a:extLst>
+              <a:ext uri="{FF2B5EF4-FFF2-40B4-BE49-F238E27FC236}">
+                <a16:creationId xmlns:a16="http://schemas.microsoft.com/office/drawing/2014/main" id="{9D5BA732-335D-DCC3-397D-461B6A6817C4}"/>
+              </a:ext>
+            </a:extLst>
+          </p:cNvPr>
+          <p:cNvSpPr txBox="1">
+            <a:spLocks/>
+          </p:cNvSpPr>
+          <p:nvPr/>
+        </p:nvSpPr>
+        <p:spPr>
+          <a:xfrm>
+            <a:off x="7968251" y="1690688"/>
+            <a:ext cx="3979334" cy="1947434"/>
+          </a:xfrm>
+          <a:prstGeom prst="rect">
+            <a:avLst/>
+          </a:prstGeom>
+        </p:spPr>
+        <p:txBody>
+          <a:bodyPr>
+            <a:normAutofit/>
+          </a:bodyPr>
+          <a:lstStyle>
+            <a:lvl1pPr marL="228600" indent="-228600" algn="l" defTabSz="914400" rtl="0" eaLnBrk="1" latinLnBrk="0" hangingPunct="1">
+              <a:lnSpc>
+                <a:spcPct val="110000"/>
+              </a:lnSpc>
+              <a:spcBef>
+                <a:spcPts val="1000"/>
+              </a:spcBef>
+              <a:buClr>
+                <a:schemeClr val="accent5"/>
+              </a:buClr>
+              <a:buFont typeface="Avenir Next LT Pro" panose="020B0504020202020204" pitchFamily="34" charset="0"/>
+              <a:buChar char="+"/>
+              <a:defRPr sz="2800" kern="1200">
+                <a:solidFill>
+                  <a:schemeClr val="tx2"/>
+                </a:solidFill>
+                <a:latin typeface="+mn-lt"/>
+                <a:ea typeface="+mn-ea"/>
+                <a:cs typeface="+mn-cs"/>
+              </a:defRPr>
+            </a:lvl1pPr>
+            <a:lvl2pPr marL="685800" indent="-228600" algn="l" defTabSz="914400" rtl="0" eaLnBrk="1" latinLnBrk="0" hangingPunct="1">
+              <a:lnSpc>
+                <a:spcPct val="110000"/>
+              </a:lnSpc>
+              <a:spcBef>
+                <a:spcPts val="500"/>
+              </a:spcBef>
+              <a:buClr>
+                <a:schemeClr val="accent5"/>
+              </a:buClr>
+              <a:buFont typeface="Avenir Next LT Pro" panose="020B0504020202020204" pitchFamily="34" charset="0"/>
+              <a:buChar char="+"/>
+              <a:defRPr sz="2400" kern="1200">
+                <a:solidFill>
+                  <a:schemeClr val="tx2"/>
+                </a:solidFill>
+                <a:latin typeface="+mn-lt"/>
+                <a:ea typeface="+mn-ea"/>
+                <a:cs typeface="+mn-cs"/>
+              </a:defRPr>
+            </a:lvl2pPr>
+            <a:lvl3pPr marL="1143000" indent="-228600" algn="l" defTabSz="914400" rtl="0" eaLnBrk="1" latinLnBrk="0" hangingPunct="1">
+              <a:lnSpc>
+                <a:spcPct val="110000"/>
+              </a:lnSpc>
+              <a:spcBef>
+                <a:spcPts val="500"/>
+              </a:spcBef>
+              <a:buClr>
+                <a:schemeClr val="accent5"/>
+              </a:buClr>
+              <a:buFont typeface="Avenir Next LT Pro" panose="020B0504020202020204" pitchFamily="34" charset="0"/>
+              <a:buChar char="+"/>
+              <a:defRPr sz="2000" kern="1200">
+                <a:solidFill>
+                  <a:schemeClr val="tx2"/>
+                </a:solidFill>
+                <a:latin typeface="+mn-lt"/>
+                <a:ea typeface="+mn-ea"/>
+                <a:cs typeface="+mn-cs"/>
+              </a:defRPr>
+            </a:lvl3pPr>
+            <a:lvl4pPr marL="1600200" indent="-228600" algn="l" defTabSz="914400" rtl="0" eaLnBrk="1" latinLnBrk="0" hangingPunct="1">
+              <a:lnSpc>
+                <a:spcPct val="110000"/>
+              </a:lnSpc>
+              <a:spcBef>
+                <a:spcPts val="500"/>
+              </a:spcBef>
+              <a:buClr>
+                <a:schemeClr val="accent5"/>
+              </a:buClr>
+              <a:buFont typeface="Avenir Next LT Pro" panose="020B0504020202020204" pitchFamily="34" charset="0"/>
+              <a:buChar char="+"/>
+              <a:defRPr sz="1800" kern="1200">
+                <a:solidFill>
+                  <a:schemeClr val="tx2"/>
+                </a:solidFill>
+                <a:latin typeface="+mn-lt"/>
+                <a:ea typeface="+mn-ea"/>
+                <a:cs typeface="+mn-cs"/>
+              </a:defRPr>
+            </a:lvl4pPr>
+            <a:lvl5pPr marL="2057400" indent="-228600" algn="l" defTabSz="914400" rtl="0" eaLnBrk="1" latinLnBrk="0" hangingPunct="1">
+              <a:lnSpc>
+                <a:spcPct val="110000"/>
+              </a:lnSpc>
+              <a:spcBef>
+                <a:spcPts val="500"/>
+              </a:spcBef>
+              <a:buClr>
+                <a:schemeClr val="accent5"/>
+              </a:buClr>
+              <a:buFont typeface="Avenir Next LT Pro" panose="020B0504020202020204" pitchFamily="34" charset="0"/>
+              <a:buChar char="+"/>
+              <a:defRPr sz="1800" kern="1200">
+                <a:solidFill>
+                  <a:schemeClr val="tx2"/>
+                </a:solidFill>
+                <a:latin typeface="+mn-lt"/>
+                <a:ea typeface="+mn-ea"/>
+                <a:cs typeface="+mn-cs"/>
+              </a:defRPr>
+            </a:lvl5pPr>
+            <a:lvl6pPr marL="2514600" indent="-228600" algn="l" defTabSz="914400" rtl="0" eaLnBrk="1" latinLnBrk="0" hangingPunct="1">
+              <a:lnSpc>
+                <a:spcPct val="90000"/>
+              </a:lnSpc>
+              <a:spcBef>
+                <a:spcPts val="500"/>
+              </a:spcBef>
+              <a:buFont typeface="Arial" panose="020B0604020202020204" pitchFamily="34" charset="0"/>
+              <a:buChar char="•"/>
+              <a:defRPr sz="1800" kern="1200">
+                <a:solidFill>
+                  <a:schemeClr val="tx1"/>
+                </a:solidFill>
+                <a:latin typeface="+mn-lt"/>
+                <a:ea typeface="+mn-ea"/>
+                <a:cs typeface="+mn-cs"/>
+              </a:defRPr>
+            </a:lvl6pPr>
+            <a:lvl7pPr marL="2971800" indent="-228600" algn="l" defTabSz="914400" rtl="0" eaLnBrk="1" latinLnBrk="0" hangingPunct="1">
+              <a:lnSpc>
+                <a:spcPct val="90000"/>
+              </a:lnSpc>
+              <a:spcBef>
+                <a:spcPts val="500"/>
+              </a:spcBef>
+              <a:buFont typeface="Arial" panose="020B0604020202020204" pitchFamily="34" charset="0"/>
+              <a:buChar char="•"/>
+              <a:defRPr sz="1800" kern="1200">
+                <a:solidFill>
+                  <a:schemeClr val="tx1"/>
+                </a:solidFill>
+                <a:latin typeface="+mn-lt"/>
+                <a:ea typeface="+mn-ea"/>
+                <a:cs typeface="+mn-cs"/>
+              </a:defRPr>
+            </a:lvl7pPr>
+            <a:lvl8pPr marL="3429000" indent="-228600" algn="l" defTabSz="914400" rtl="0" eaLnBrk="1" latinLnBrk="0" hangingPunct="1">
+              <a:lnSpc>
+                <a:spcPct val="90000"/>
+              </a:lnSpc>
+              <a:spcBef>
+                <a:spcPts val="500"/>
+              </a:spcBef>
+              <a:buFont typeface="Arial" panose="020B0604020202020204" pitchFamily="34" charset="0"/>
+              <a:buChar char="•"/>
+              <a:defRPr sz="1800" kern="1200">
+                <a:solidFill>
+                  <a:schemeClr val="tx1"/>
+                </a:solidFill>
+                <a:latin typeface="+mn-lt"/>
+                <a:ea typeface="+mn-ea"/>
+                <a:cs typeface="+mn-cs"/>
+              </a:defRPr>
+            </a:lvl8pPr>
+            <a:lvl9pPr marL="3886200" indent="-228600" algn="l" defTabSz="914400" rtl="0" eaLnBrk="1" latinLnBrk="0" hangingPunct="1">
+              <a:lnSpc>
+                <a:spcPct val="90000"/>
+              </a:lnSpc>
+              <a:spcBef>
+                <a:spcPts val="500"/>
+              </a:spcBef>
+              <a:buFont typeface="Arial" panose="020B0604020202020204" pitchFamily="34" charset="0"/>
+              <a:buChar char="•"/>
+              <a:defRPr sz="1800" kern="1200">
+                <a:solidFill>
+                  <a:schemeClr val="tx1"/>
+                </a:solidFill>
+                <a:latin typeface="+mn-lt"/>
+                <a:ea typeface="+mn-ea"/>
+                <a:cs typeface="+mn-cs"/>
+              </a:defRPr>
+            </a:lvl9pPr>
+          </a:lstStyle>
+          <a:p>
+            <a:pPr>
+              <a:buFont typeface="Wingdings" panose="05000000000000000000" pitchFamily="2" charset="2"/>
+              <a:buChar char="§"/>
+            </a:pPr>
+            <a:r>
+              <a:rPr lang="en-US" sz="2000" dirty="0"/>
+              <a:t>Graph to display the number of trees with the best MSE</a:t>
+            </a:r>
+          </a:p>
+          <a:p>
+            <a:pPr>
+              <a:buFont typeface="Wingdings" panose="05000000000000000000" pitchFamily="2" charset="2"/>
+              <a:buChar char="§"/>
+            </a:pPr>
+            <a:r>
+              <a:rPr lang="en-US" sz="2000" dirty="0"/>
+              <a:t>Best value is 190</a:t>
+            </a:r>
+          </a:p>
+        </p:txBody>
+      </p:sp>
+    </p:spTree>
+    <p:extLst>
+      <p:ext uri="{BB962C8B-B14F-4D97-AF65-F5344CB8AC3E}">
+        <p14:creationId xmlns:p14="http://schemas.microsoft.com/office/powerpoint/2010/main" val="1914593842"/>
+      </p:ext>
+    </p:extLst>
+  </p:cSld>
+  <p:clrMapOvr>
+    <a:masterClrMapping/>
+  </p:clrMapOvr>
+</p:sld>
+</file>
+
+<file path=ppt/slides/slide15.xml><?xml version="1.0" encoding="utf-8"?>
+<p:sld xmlns:a="http://schemas.openxmlformats.org/drawingml/2006/main" xmlns:r="http://schemas.openxmlformats.org/officeDocument/2006/relationships" xmlns:p="http://schemas.openxmlformats.org/presentationml/2006/main">
+  <p:cSld>
+    <p:spTree>
+      <p:nvGrpSpPr>
+        <p:cNvPr id="1" name=""/>
+        <p:cNvGrpSpPr/>
+        <p:nvPr/>
+      </p:nvGrpSpPr>
+      <p:grpSpPr>
+        <a:xfrm>
+          <a:off x="0" y="0"/>
+          <a:ext cx="0" cy="0"/>
+          <a:chOff x="0" y="0"/>
+          <a:chExt cx="0" cy="0"/>
+        </a:xfrm>
+      </p:grpSpPr>
+      <p:sp>
+        <p:nvSpPr>
+          <p:cNvPr id="2" name="Title 1">
+            <a:extLst>
+              <a:ext uri="{FF2B5EF4-FFF2-40B4-BE49-F238E27FC236}">
+                <a16:creationId xmlns:a16="http://schemas.microsoft.com/office/drawing/2014/main" id="{E5413A49-5ABD-E269-526A-1ACD2D7B8514}"/>
+              </a:ext>
+            </a:extLst>
+          </p:cNvPr>
+          <p:cNvSpPr>
+            <a:spLocks noGrp="1"/>
+          </p:cNvSpPr>
+          <p:nvPr>
+            <p:ph type="title"/>
+          </p:nvPr>
+        </p:nvSpPr>
+        <p:spPr/>
+        <p:txBody>
+          <a:bodyPr/>
+          <a:lstStyle/>
+          <a:p>
+            <a:r>
+              <a:rPr lang="en-US" dirty="0"/>
+              <a:t>Finding the best params</a:t>
+            </a:r>
+          </a:p>
+        </p:txBody>
+      </p:sp>
+      <p:sp>
+        <p:nvSpPr>
+          <p:cNvPr id="3" name="Slide Number Placeholder 2">
+            <a:extLst>
+              <a:ext uri="{FF2B5EF4-FFF2-40B4-BE49-F238E27FC236}">
+                <a16:creationId xmlns:a16="http://schemas.microsoft.com/office/drawing/2014/main" id="{0A048661-6862-D4E6-BAB2-80CAEE82EFCA}"/>
+              </a:ext>
+            </a:extLst>
+          </p:cNvPr>
+          <p:cNvSpPr>
+            <a:spLocks noGrp="1"/>
+          </p:cNvSpPr>
+          <p:nvPr>
+            <p:ph type="sldNum" sz="quarter" idx="12"/>
+          </p:nvPr>
+        </p:nvSpPr>
+        <p:spPr/>
+        <p:txBody>
+          <a:bodyPr/>
+          <a:lstStyle/>
+          <a:p>
+            <a:fld id="{73B850FF-6169-4056-8077-06FFA93A5366}" type="slidenum">
+              <a:rPr lang="en-US" smtClean="0"/>
+              <a:t>15</a:t>
+            </a:fld>
+            <a:endParaRPr lang="en-US"/>
+          </a:p>
+        </p:txBody>
+      </p:sp>
+      <p:sp>
+        <p:nvSpPr>
+          <p:cNvPr id="4" name="Content Placeholder 4">
+            <a:extLst>
+              <a:ext uri="{FF2B5EF4-FFF2-40B4-BE49-F238E27FC236}">
+                <a16:creationId xmlns:a16="http://schemas.microsoft.com/office/drawing/2014/main" id="{93615D6E-D2D5-D0F7-8B8F-51834E1900F4}"/>
+              </a:ext>
+            </a:extLst>
+          </p:cNvPr>
+          <p:cNvSpPr txBox="1">
+            <a:spLocks/>
+          </p:cNvSpPr>
+          <p:nvPr/>
+        </p:nvSpPr>
+        <p:spPr>
+          <a:xfrm>
+            <a:off x="937721" y="1707850"/>
+            <a:ext cx="6066927" cy="4347893"/>
+          </a:xfrm>
+          <a:prstGeom prst="rect">
+            <a:avLst/>
+          </a:prstGeom>
+        </p:spPr>
+        <p:txBody>
+          <a:bodyPr>
+            <a:normAutofit/>
+          </a:bodyPr>
+          <a:lstStyle>
+            <a:lvl1pPr marL="228600" indent="-228600" algn="l" defTabSz="914400" rtl="0" eaLnBrk="1" latinLnBrk="0" hangingPunct="1">
+              <a:lnSpc>
+                <a:spcPct val="110000"/>
+              </a:lnSpc>
+              <a:spcBef>
+                <a:spcPts val="1000"/>
+              </a:spcBef>
+              <a:buClr>
+                <a:schemeClr val="accent5"/>
+              </a:buClr>
+              <a:buFont typeface="Avenir Next LT Pro" panose="020B0504020202020204" pitchFamily="34" charset="0"/>
+              <a:buChar char="+"/>
+              <a:defRPr sz="2800" kern="1200">
+                <a:solidFill>
+                  <a:schemeClr val="tx2"/>
+                </a:solidFill>
+                <a:latin typeface="+mn-lt"/>
+                <a:ea typeface="+mn-ea"/>
+                <a:cs typeface="+mn-cs"/>
+              </a:defRPr>
+            </a:lvl1pPr>
+            <a:lvl2pPr marL="685800" indent="-228600" algn="l" defTabSz="914400" rtl="0" eaLnBrk="1" latinLnBrk="0" hangingPunct="1">
+              <a:lnSpc>
+                <a:spcPct val="110000"/>
+              </a:lnSpc>
+              <a:spcBef>
+                <a:spcPts val="500"/>
+              </a:spcBef>
+              <a:buClr>
+                <a:schemeClr val="accent5"/>
+              </a:buClr>
+              <a:buFont typeface="Avenir Next LT Pro" panose="020B0504020202020204" pitchFamily="34" charset="0"/>
+              <a:buChar char="+"/>
+              <a:defRPr sz="2400" kern="1200">
+                <a:solidFill>
+                  <a:schemeClr val="tx2"/>
+                </a:solidFill>
+                <a:latin typeface="+mn-lt"/>
+                <a:ea typeface="+mn-ea"/>
+                <a:cs typeface="+mn-cs"/>
+              </a:defRPr>
+            </a:lvl2pPr>
+            <a:lvl3pPr marL="1143000" indent="-228600" algn="l" defTabSz="914400" rtl="0" eaLnBrk="1" latinLnBrk="0" hangingPunct="1">
+              <a:lnSpc>
+                <a:spcPct val="110000"/>
+              </a:lnSpc>
+              <a:spcBef>
+                <a:spcPts val="500"/>
+              </a:spcBef>
+              <a:buClr>
+                <a:schemeClr val="accent5"/>
+              </a:buClr>
+              <a:buFont typeface="Avenir Next LT Pro" panose="020B0504020202020204" pitchFamily="34" charset="0"/>
+              <a:buChar char="+"/>
+              <a:defRPr sz="2000" kern="1200">
+                <a:solidFill>
+                  <a:schemeClr val="tx2"/>
+                </a:solidFill>
+                <a:latin typeface="+mn-lt"/>
+                <a:ea typeface="+mn-ea"/>
+                <a:cs typeface="+mn-cs"/>
+              </a:defRPr>
+            </a:lvl3pPr>
+            <a:lvl4pPr marL="1600200" indent="-228600" algn="l" defTabSz="914400" rtl="0" eaLnBrk="1" latinLnBrk="0" hangingPunct="1">
+              <a:lnSpc>
+                <a:spcPct val="110000"/>
+              </a:lnSpc>
+              <a:spcBef>
+                <a:spcPts val="500"/>
+              </a:spcBef>
+              <a:buClr>
+                <a:schemeClr val="accent5"/>
+              </a:buClr>
+              <a:buFont typeface="Avenir Next LT Pro" panose="020B0504020202020204" pitchFamily="34" charset="0"/>
+              <a:buChar char="+"/>
+              <a:defRPr sz="1800" kern="1200">
+                <a:solidFill>
+                  <a:schemeClr val="tx2"/>
+                </a:solidFill>
+                <a:latin typeface="+mn-lt"/>
+                <a:ea typeface="+mn-ea"/>
+                <a:cs typeface="+mn-cs"/>
+              </a:defRPr>
+            </a:lvl4pPr>
+            <a:lvl5pPr marL="2057400" indent="-228600" algn="l" defTabSz="914400" rtl="0" eaLnBrk="1" latinLnBrk="0" hangingPunct="1">
+              <a:lnSpc>
+                <a:spcPct val="110000"/>
+              </a:lnSpc>
+              <a:spcBef>
+                <a:spcPts val="500"/>
+              </a:spcBef>
+              <a:buClr>
+                <a:schemeClr val="accent5"/>
+              </a:buClr>
+              <a:buFont typeface="Avenir Next LT Pro" panose="020B0504020202020204" pitchFamily="34" charset="0"/>
+              <a:buChar char="+"/>
+              <a:defRPr sz="1800" kern="1200">
+                <a:solidFill>
+                  <a:schemeClr val="tx2"/>
+                </a:solidFill>
+                <a:latin typeface="+mn-lt"/>
+                <a:ea typeface="+mn-ea"/>
+                <a:cs typeface="+mn-cs"/>
+              </a:defRPr>
+            </a:lvl5pPr>
+            <a:lvl6pPr marL="2514600" indent="-228600" algn="l" defTabSz="914400" rtl="0" eaLnBrk="1" latinLnBrk="0" hangingPunct="1">
+              <a:lnSpc>
+                <a:spcPct val="90000"/>
+              </a:lnSpc>
+              <a:spcBef>
+                <a:spcPts val="500"/>
+              </a:spcBef>
+              <a:buFont typeface="Arial" panose="020B0604020202020204" pitchFamily="34" charset="0"/>
+              <a:buChar char="•"/>
+              <a:defRPr sz="1800" kern="1200">
+                <a:solidFill>
+                  <a:schemeClr val="tx1"/>
+                </a:solidFill>
+                <a:latin typeface="+mn-lt"/>
+                <a:ea typeface="+mn-ea"/>
+                <a:cs typeface="+mn-cs"/>
+              </a:defRPr>
+            </a:lvl6pPr>
+            <a:lvl7pPr marL="2971800" indent="-228600" algn="l" defTabSz="914400" rtl="0" eaLnBrk="1" latinLnBrk="0" hangingPunct="1">
+              <a:lnSpc>
+                <a:spcPct val="90000"/>
+              </a:lnSpc>
+              <a:spcBef>
+                <a:spcPts val="500"/>
+              </a:spcBef>
+              <a:buFont typeface="Arial" panose="020B0604020202020204" pitchFamily="34" charset="0"/>
+              <a:buChar char="•"/>
+              <a:defRPr sz="1800" kern="1200">
+                <a:solidFill>
+                  <a:schemeClr val="tx1"/>
+                </a:solidFill>
+                <a:latin typeface="+mn-lt"/>
+                <a:ea typeface="+mn-ea"/>
+                <a:cs typeface="+mn-cs"/>
+              </a:defRPr>
+            </a:lvl7pPr>
+            <a:lvl8pPr marL="3429000" indent="-228600" algn="l" defTabSz="914400" rtl="0" eaLnBrk="1" latinLnBrk="0" hangingPunct="1">
+              <a:lnSpc>
+                <a:spcPct val="90000"/>
+              </a:lnSpc>
+              <a:spcBef>
+                <a:spcPts val="500"/>
+              </a:spcBef>
+              <a:buFont typeface="Arial" panose="020B0604020202020204" pitchFamily="34" charset="0"/>
+              <a:buChar char="•"/>
+              <a:defRPr sz="1800" kern="1200">
+                <a:solidFill>
+                  <a:schemeClr val="tx1"/>
+                </a:solidFill>
+                <a:latin typeface="+mn-lt"/>
+                <a:ea typeface="+mn-ea"/>
+                <a:cs typeface="+mn-cs"/>
+              </a:defRPr>
+            </a:lvl8pPr>
+            <a:lvl9pPr marL="3886200" indent="-228600" algn="l" defTabSz="914400" rtl="0" eaLnBrk="1" latinLnBrk="0" hangingPunct="1">
+              <a:lnSpc>
+                <a:spcPct val="90000"/>
+              </a:lnSpc>
+              <a:spcBef>
+                <a:spcPts val="500"/>
+              </a:spcBef>
+              <a:buFont typeface="Arial" panose="020B0604020202020204" pitchFamily="34" charset="0"/>
+              <a:buChar char="•"/>
+              <a:defRPr sz="1800" kern="1200">
+                <a:solidFill>
+                  <a:schemeClr val="tx1"/>
+                </a:solidFill>
+                <a:latin typeface="+mn-lt"/>
+                <a:ea typeface="+mn-ea"/>
+                <a:cs typeface="+mn-cs"/>
+              </a:defRPr>
+            </a:lvl9pPr>
+          </a:lstStyle>
+          <a:p>
+            <a:pPr>
+              <a:buFont typeface="Wingdings" panose="05000000000000000000" pitchFamily="2" charset="2"/>
+              <a:buChar char="§"/>
+            </a:pPr>
+            <a:r>
+              <a:rPr lang="en-US" dirty="0"/>
+              <a:t>Using </a:t>
+            </a:r>
+            <a:r>
+              <a:rPr lang="en-US" dirty="0" err="1"/>
+              <a:t>GridSearchCV</a:t>
+            </a:r>
+            <a:r>
+              <a:rPr lang="en-US" dirty="0"/>
+              <a:t> to find the best params</a:t>
+            </a:r>
+          </a:p>
+          <a:p>
+            <a:pPr>
+              <a:buFont typeface="Wingdings" panose="05000000000000000000" pitchFamily="2" charset="2"/>
+              <a:buChar char="§"/>
+            </a:pPr>
+            <a:r>
+              <a:rPr lang="en-US" dirty="0"/>
+              <a:t>Turns out, </a:t>
+            </a:r>
+            <a:r>
+              <a:rPr lang="en-US" dirty="0" err="1"/>
+              <a:t>min_samples_split</a:t>
+            </a:r>
+            <a:r>
+              <a:rPr lang="en-US" dirty="0"/>
+              <a:t>=5 is the best value.</a:t>
+            </a:r>
+          </a:p>
+          <a:p>
+            <a:pPr>
+              <a:buFont typeface="Wingdings" panose="05000000000000000000" pitchFamily="2" charset="2"/>
+              <a:buChar char="§"/>
+            </a:pPr>
+            <a:r>
+              <a:rPr lang="en-US" dirty="0"/>
+              <a:t>It is the minimum number of samples requires to split a “middle node”</a:t>
+            </a:r>
+          </a:p>
+          <a:p>
+            <a:pPr>
+              <a:buFont typeface="Wingdings" panose="05000000000000000000" pitchFamily="2" charset="2"/>
+              <a:buChar char="§"/>
+            </a:pPr>
+            <a:endParaRPr lang="en-US" dirty="0"/>
+          </a:p>
+        </p:txBody>
+      </p:sp>
+    </p:spTree>
+    <p:extLst>
+      <p:ext uri="{BB962C8B-B14F-4D97-AF65-F5344CB8AC3E}">
+        <p14:creationId xmlns:p14="http://schemas.microsoft.com/office/powerpoint/2010/main" val="631009258"/>
+      </p:ext>
+    </p:extLst>
+  </p:cSld>
+  <p:clrMapOvr>
+    <a:masterClrMapping/>
+  </p:clrMapOvr>
+</p:sld>
+</file>
+
+<file path=ppt/slides/slide16.xml><?xml version="1.0" encoding="utf-8"?>
+<p:sld xmlns:a="http://schemas.openxmlformats.org/drawingml/2006/main" xmlns:r="http://schemas.openxmlformats.org/officeDocument/2006/relationships" xmlns:p="http://schemas.openxmlformats.org/presentationml/2006/main">
+  <p:cSld>
+    <p:spTree>
+      <p:nvGrpSpPr>
+        <p:cNvPr id="1" name=""/>
+        <p:cNvGrpSpPr/>
+        <p:nvPr/>
+      </p:nvGrpSpPr>
+      <p:grpSpPr>
+        <a:xfrm>
+          <a:off x="0" y="0"/>
+          <a:ext cx="0" cy="0"/>
+          <a:chOff x="0" y="0"/>
+          <a:chExt cx="0" cy="0"/>
+        </a:xfrm>
+      </p:grpSpPr>
+      <p:sp>
+        <p:nvSpPr>
+          <p:cNvPr id="2" name="Title 1">
+            <a:extLst>
+              <a:ext uri="{FF2B5EF4-FFF2-40B4-BE49-F238E27FC236}">
+                <a16:creationId xmlns:a16="http://schemas.microsoft.com/office/drawing/2014/main" id="{6D76E3BE-12F1-99BE-47BD-60DAE85BC137}"/>
+              </a:ext>
+            </a:extLst>
+          </p:cNvPr>
+          <p:cNvSpPr>
+            <a:spLocks noGrp="1"/>
+          </p:cNvSpPr>
+          <p:nvPr>
+            <p:ph type="title"/>
+          </p:nvPr>
+        </p:nvSpPr>
+        <p:spPr/>
+        <p:txBody>
+          <a:bodyPr/>
+          <a:lstStyle/>
+          <a:p>
+            <a:r>
+              <a:rPr lang="en-US" dirty="0"/>
+              <a:t>Random Forest – Absolute Residual Plot</a:t>
+            </a:r>
+          </a:p>
+        </p:txBody>
+      </p:sp>
+      <p:sp>
+        <p:nvSpPr>
+          <p:cNvPr id="3" name="Slide Number Placeholder 2">
+            <a:extLst>
+              <a:ext uri="{FF2B5EF4-FFF2-40B4-BE49-F238E27FC236}">
+                <a16:creationId xmlns:a16="http://schemas.microsoft.com/office/drawing/2014/main" id="{1D9AF8F1-AA89-CF6D-D7AB-41E4FC5EDDCA}"/>
+              </a:ext>
+            </a:extLst>
+          </p:cNvPr>
+          <p:cNvSpPr>
+            <a:spLocks noGrp="1"/>
+          </p:cNvSpPr>
+          <p:nvPr>
+            <p:ph type="sldNum" sz="quarter" idx="12"/>
+          </p:nvPr>
+        </p:nvSpPr>
+        <p:spPr/>
+        <p:txBody>
+          <a:bodyPr/>
+          <a:lstStyle/>
+          <a:p>
+            <a:fld id="{73B850FF-6169-4056-8077-06FFA93A5366}" type="slidenum">
+              <a:rPr lang="en-US" smtClean="0"/>
+              <a:t>16</a:t>
+            </a:fld>
+            <a:endParaRPr lang="en-US"/>
+          </a:p>
+        </p:txBody>
+      </p:sp>
+      <p:pic>
+        <p:nvPicPr>
+          <p:cNvPr id="5" name="Picture 4" descr="A diagram of a number of values&#10;&#10;Description automatically generated">
+            <a:extLst>
+              <a:ext uri="{FF2B5EF4-FFF2-40B4-BE49-F238E27FC236}">
+                <a16:creationId xmlns:a16="http://schemas.microsoft.com/office/drawing/2014/main" id="{E64ADA19-7E90-AF7A-6A81-F49A9BFD154B}"/>
+              </a:ext>
+            </a:extLst>
+          </p:cNvPr>
+          <p:cNvPicPr>
+            <a:picLocks noChangeAspect="1"/>
+          </p:cNvPicPr>
+          <p:nvPr/>
+        </p:nvPicPr>
+        <p:blipFill>
+          <a:blip r:embed="rId2">
+            <a:extLst>
+              <a:ext uri="{28A0092B-C50C-407E-A947-70E740481C1C}">
+                <a14:useLocalDpi xmlns:a14="http://schemas.microsoft.com/office/drawing/2010/main" val="0"/>
+              </a:ext>
+            </a:extLst>
+          </a:blip>
+          <a:stretch>
+            <a:fillRect/>
+          </a:stretch>
+        </p:blipFill>
+        <p:spPr>
+          <a:xfrm>
+            <a:off x="570345" y="1645910"/>
+            <a:ext cx="7772415" cy="5212090"/>
+          </a:xfrm>
+          <a:prstGeom prst="rect">
+            <a:avLst/>
+          </a:prstGeom>
+        </p:spPr>
+      </p:pic>
+      <p:sp>
+        <p:nvSpPr>
+          <p:cNvPr id="6" name="Content Placeholder 4">
+            <a:extLst>
+              <a:ext uri="{FF2B5EF4-FFF2-40B4-BE49-F238E27FC236}">
+                <a16:creationId xmlns:a16="http://schemas.microsoft.com/office/drawing/2014/main" id="{B7C8A73A-DEC4-D6F4-5652-30F8A0CD8E78}"/>
+              </a:ext>
+            </a:extLst>
+          </p:cNvPr>
+          <p:cNvSpPr txBox="1">
+            <a:spLocks/>
+          </p:cNvSpPr>
+          <p:nvPr/>
+        </p:nvSpPr>
+        <p:spPr>
+          <a:xfrm>
+            <a:off x="8459956" y="2145096"/>
+            <a:ext cx="3979334" cy="1947434"/>
+          </a:xfrm>
+          <a:prstGeom prst="rect">
+            <a:avLst/>
+          </a:prstGeom>
+        </p:spPr>
+        <p:txBody>
+          <a:bodyPr>
+            <a:normAutofit/>
+          </a:bodyPr>
+          <a:lstStyle>
+            <a:lvl1pPr marL="228600" indent="-228600" algn="l" defTabSz="914400" rtl="0" eaLnBrk="1" latinLnBrk="0" hangingPunct="1">
+              <a:lnSpc>
+                <a:spcPct val="110000"/>
+              </a:lnSpc>
+              <a:spcBef>
+                <a:spcPts val="1000"/>
+              </a:spcBef>
+              <a:buClr>
+                <a:schemeClr val="accent5"/>
+              </a:buClr>
+              <a:buFont typeface="Avenir Next LT Pro" panose="020B0504020202020204" pitchFamily="34" charset="0"/>
+              <a:buChar char="+"/>
+              <a:defRPr sz="2800" kern="1200">
+                <a:solidFill>
+                  <a:schemeClr val="tx2"/>
+                </a:solidFill>
+                <a:latin typeface="+mn-lt"/>
+                <a:ea typeface="+mn-ea"/>
+                <a:cs typeface="+mn-cs"/>
+              </a:defRPr>
+            </a:lvl1pPr>
+            <a:lvl2pPr marL="685800" indent="-228600" algn="l" defTabSz="914400" rtl="0" eaLnBrk="1" latinLnBrk="0" hangingPunct="1">
+              <a:lnSpc>
+                <a:spcPct val="110000"/>
+              </a:lnSpc>
+              <a:spcBef>
+                <a:spcPts val="500"/>
+              </a:spcBef>
+              <a:buClr>
+                <a:schemeClr val="accent5"/>
+              </a:buClr>
+              <a:buFont typeface="Avenir Next LT Pro" panose="020B0504020202020204" pitchFamily="34" charset="0"/>
+              <a:buChar char="+"/>
+              <a:defRPr sz="2400" kern="1200">
+                <a:solidFill>
+                  <a:schemeClr val="tx2"/>
+                </a:solidFill>
+                <a:latin typeface="+mn-lt"/>
+                <a:ea typeface="+mn-ea"/>
+                <a:cs typeface="+mn-cs"/>
+              </a:defRPr>
+            </a:lvl2pPr>
+            <a:lvl3pPr marL="1143000" indent="-228600" algn="l" defTabSz="914400" rtl="0" eaLnBrk="1" latinLnBrk="0" hangingPunct="1">
+              <a:lnSpc>
+                <a:spcPct val="110000"/>
+              </a:lnSpc>
+              <a:spcBef>
+                <a:spcPts val="500"/>
+              </a:spcBef>
+              <a:buClr>
+                <a:schemeClr val="accent5"/>
+              </a:buClr>
+              <a:buFont typeface="Avenir Next LT Pro" panose="020B0504020202020204" pitchFamily="34" charset="0"/>
+              <a:buChar char="+"/>
+              <a:defRPr sz="2000" kern="1200">
+                <a:solidFill>
+                  <a:schemeClr val="tx2"/>
+                </a:solidFill>
+                <a:latin typeface="+mn-lt"/>
+                <a:ea typeface="+mn-ea"/>
+                <a:cs typeface="+mn-cs"/>
+              </a:defRPr>
+            </a:lvl3pPr>
+            <a:lvl4pPr marL="1600200" indent="-228600" algn="l" defTabSz="914400" rtl="0" eaLnBrk="1" latinLnBrk="0" hangingPunct="1">
+              <a:lnSpc>
+                <a:spcPct val="110000"/>
+              </a:lnSpc>
+              <a:spcBef>
+                <a:spcPts val="500"/>
+              </a:spcBef>
+              <a:buClr>
+                <a:schemeClr val="accent5"/>
+              </a:buClr>
+              <a:buFont typeface="Avenir Next LT Pro" panose="020B0504020202020204" pitchFamily="34" charset="0"/>
+              <a:buChar char="+"/>
+              <a:defRPr sz="1800" kern="1200">
+                <a:solidFill>
+                  <a:schemeClr val="tx2"/>
+                </a:solidFill>
+                <a:latin typeface="+mn-lt"/>
+                <a:ea typeface="+mn-ea"/>
+                <a:cs typeface="+mn-cs"/>
+              </a:defRPr>
+            </a:lvl4pPr>
+            <a:lvl5pPr marL="2057400" indent="-228600" algn="l" defTabSz="914400" rtl="0" eaLnBrk="1" latinLnBrk="0" hangingPunct="1">
+              <a:lnSpc>
+                <a:spcPct val="110000"/>
+              </a:lnSpc>
+              <a:spcBef>
+                <a:spcPts val="500"/>
+              </a:spcBef>
+              <a:buClr>
+                <a:schemeClr val="accent5"/>
+              </a:buClr>
+              <a:buFont typeface="Avenir Next LT Pro" panose="020B0504020202020204" pitchFamily="34" charset="0"/>
+              <a:buChar char="+"/>
+              <a:defRPr sz="1800" kern="1200">
+                <a:solidFill>
+                  <a:schemeClr val="tx2"/>
+                </a:solidFill>
+                <a:latin typeface="+mn-lt"/>
+                <a:ea typeface="+mn-ea"/>
+                <a:cs typeface="+mn-cs"/>
+              </a:defRPr>
+            </a:lvl5pPr>
+            <a:lvl6pPr marL="2514600" indent="-228600" algn="l" defTabSz="914400" rtl="0" eaLnBrk="1" latinLnBrk="0" hangingPunct="1">
+              <a:lnSpc>
+                <a:spcPct val="90000"/>
+              </a:lnSpc>
+              <a:spcBef>
+                <a:spcPts val="500"/>
+              </a:spcBef>
+              <a:buFont typeface="Arial" panose="020B0604020202020204" pitchFamily="34" charset="0"/>
+              <a:buChar char="•"/>
+              <a:defRPr sz="1800" kern="1200">
+                <a:solidFill>
+                  <a:schemeClr val="tx1"/>
+                </a:solidFill>
+                <a:latin typeface="+mn-lt"/>
+                <a:ea typeface="+mn-ea"/>
+                <a:cs typeface="+mn-cs"/>
+              </a:defRPr>
+            </a:lvl6pPr>
+            <a:lvl7pPr marL="2971800" indent="-228600" algn="l" defTabSz="914400" rtl="0" eaLnBrk="1" latinLnBrk="0" hangingPunct="1">
+              <a:lnSpc>
+                <a:spcPct val="90000"/>
+              </a:lnSpc>
+              <a:spcBef>
+                <a:spcPts val="500"/>
+              </a:spcBef>
+              <a:buFont typeface="Arial" panose="020B0604020202020204" pitchFamily="34" charset="0"/>
+              <a:buChar char="•"/>
+              <a:defRPr sz="1800" kern="1200">
+                <a:solidFill>
+                  <a:schemeClr val="tx1"/>
+                </a:solidFill>
+                <a:latin typeface="+mn-lt"/>
+                <a:ea typeface="+mn-ea"/>
+                <a:cs typeface="+mn-cs"/>
+              </a:defRPr>
+            </a:lvl7pPr>
+            <a:lvl8pPr marL="3429000" indent="-228600" algn="l" defTabSz="914400" rtl="0" eaLnBrk="1" latinLnBrk="0" hangingPunct="1">
+              <a:lnSpc>
+                <a:spcPct val="90000"/>
+              </a:lnSpc>
+              <a:spcBef>
+                <a:spcPts val="500"/>
+              </a:spcBef>
+              <a:buFont typeface="Arial" panose="020B0604020202020204" pitchFamily="34" charset="0"/>
+              <a:buChar char="•"/>
+              <a:defRPr sz="1800" kern="1200">
+                <a:solidFill>
+                  <a:schemeClr val="tx1"/>
+                </a:solidFill>
+                <a:latin typeface="+mn-lt"/>
+                <a:ea typeface="+mn-ea"/>
+                <a:cs typeface="+mn-cs"/>
+              </a:defRPr>
+            </a:lvl8pPr>
+            <a:lvl9pPr marL="3886200" indent="-228600" algn="l" defTabSz="914400" rtl="0" eaLnBrk="1" latinLnBrk="0" hangingPunct="1">
+              <a:lnSpc>
+                <a:spcPct val="90000"/>
+              </a:lnSpc>
+              <a:spcBef>
+                <a:spcPts val="500"/>
+              </a:spcBef>
+              <a:buFont typeface="Arial" panose="020B0604020202020204" pitchFamily="34" charset="0"/>
+              <a:buChar char="•"/>
+              <a:defRPr sz="1800" kern="1200">
+                <a:solidFill>
+                  <a:schemeClr val="tx1"/>
+                </a:solidFill>
+                <a:latin typeface="+mn-lt"/>
+                <a:ea typeface="+mn-ea"/>
+                <a:cs typeface="+mn-cs"/>
+              </a:defRPr>
+            </a:lvl9pPr>
+          </a:lstStyle>
+          <a:p>
+            <a:pPr>
+              <a:buFont typeface="Wingdings" panose="05000000000000000000" pitchFamily="2" charset="2"/>
+              <a:buChar char="§"/>
+            </a:pPr>
+            <a:r>
+              <a:rPr lang="en-US" sz="2000" dirty="0"/>
+              <a:t>The graph displays the correctness of the regressor.</a:t>
+            </a:r>
+          </a:p>
+          <a:p>
+            <a:pPr>
+              <a:buFont typeface="Wingdings" panose="05000000000000000000" pitchFamily="2" charset="2"/>
+              <a:buChar char="§"/>
+            </a:pPr>
+            <a:r>
+              <a:rPr lang="en-US" sz="2000" dirty="0"/>
+              <a:t>By comparing the predictions and the actual values.</a:t>
+            </a:r>
+          </a:p>
+        </p:txBody>
+      </p:sp>
+    </p:spTree>
+    <p:extLst>
+      <p:ext uri="{BB962C8B-B14F-4D97-AF65-F5344CB8AC3E}">
+        <p14:creationId xmlns:p14="http://schemas.microsoft.com/office/powerpoint/2010/main" val="1547969803"/>
+      </p:ext>
+    </p:extLst>
+  </p:cSld>
+  <p:clrMapOvr>
+    <a:masterClrMapping/>
+  </p:clrMapOvr>
+</p:sld>
+</file>
+
+<file path=ppt/slides/slide17.xml><?xml version="1.0" encoding="utf-8"?>
+<p:sld xmlns:a="http://schemas.openxmlformats.org/drawingml/2006/main" xmlns:r="http://schemas.openxmlformats.org/officeDocument/2006/relationships" xmlns:p="http://schemas.openxmlformats.org/presentationml/2006/main">
+  <p:cSld>
+    <p:spTree>
+      <p:nvGrpSpPr>
+        <p:cNvPr id="1" name=""/>
+        <p:cNvGrpSpPr/>
+        <p:nvPr/>
+      </p:nvGrpSpPr>
+      <p:grpSpPr>
+        <a:xfrm>
+          <a:off x="0" y="0"/>
+          <a:ext cx="0" cy="0"/>
+          <a:chOff x="0" y="0"/>
+          <a:chExt cx="0" cy="0"/>
+        </a:xfrm>
+      </p:grpSpPr>
+      <p:sp>
+        <p:nvSpPr>
+          <p:cNvPr id="2" name="Title 1">
+            <a:extLst>
+              <a:ext uri="{FF2B5EF4-FFF2-40B4-BE49-F238E27FC236}">
+                <a16:creationId xmlns:a16="http://schemas.microsoft.com/office/drawing/2014/main" id="{B45450CB-46CF-181C-5C44-62C331166C46}"/>
+              </a:ext>
+            </a:extLst>
+          </p:cNvPr>
+          <p:cNvSpPr>
+            <a:spLocks noGrp="1"/>
+          </p:cNvSpPr>
+          <p:nvPr>
+            <p:ph type="title"/>
+          </p:nvPr>
+        </p:nvSpPr>
+        <p:spPr/>
+        <p:txBody>
+          <a:bodyPr/>
+          <a:lstStyle/>
+          <a:p>
+            <a:pPr algn="ctr"/>
+            <a:r>
+              <a:rPr lang="en-US" dirty="0"/>
+              <a:t>Weighted Random Forests</a:t>
+            </a:r>
+          </a:p>
+        </p:txBody>
+      </p:sp>
+      <p:sp>
+        <p:nvSpPr>
+          <p:cNvPr id="3" name="Slide Number Placeholder 2">
+            <a:extLst>
+              <a:ext uri="{FF2B5EF4-FFF2-40B4-BE49-F238E27FC236}">
+                <a16:creationId xmlns:a16="http://schemas.microsoft.com/office/drawing/2014/main" id="{28693483-F4E7-F3EC-C0AE-16027F659F53}"/>
+              </a:ext>
+            </a:extLst>
+          </p:cNvPr>
+          <p:cNvSpPr>
+            <a:spLocks noGrp="1"/>
+          </p:cNvSpPr>
+          <p:nvPr>
+            <p:ph type="sldNum" sz="quarter" idx="12"/>
+          </p:nvPr>
+        </p:nvSpPr>
+        <p:spPr/>
+        <p:txBody>
+          <a:bodyPr/>
+          <a:lstStyle/>
+          <a:p>
+            <a:fld id="{73B850FF-6169-4056-8077-06FFA93A5366}" type="slidenum">
+              <a:rPr lang="en-US" smtClean="0"/>
+              <a:t>17</a:t>
+            </a:fld>
+            <a:endParaRPr lang="en-US"/>
+          </a:p>
+        </p:txBody>
+      </p:sp>
+      <p:sp>
+        <p:nvSpPr>
+          <p:cNvPr id="4" name="Content Placeholder 4">
+            <a:extLst>
+              <a:ext uri="{FF2B5EF4-FFF2-40B4-BE49-F238E27FC236}">
+                <a16:creationId xmlns:a16="http://schemas.microsoft.com/office/drawing/2014/main" id="{60904351-1A05-6F7D-E9C5-E151F50F4DBD}"/>
+              </a:ext>
+            </a:extLst>
+          </p:cNvPr>
+          <p:cNvSpPr txBox="1">
+            <a:spLocks/>
+          </p:cNvSpPr>
+          <p:nvPr/>
+        </p:nvSpPr>
+        <p:spPr>
+          <a:xfrm>
+            <a:off x="937721" y="1690688"/>
+            <a:ext cx="6066927" cy="3787086"/>
+          </a:xfrm>
+          <a:prstGeom prst="rect">
+            <a:avLst/>
+          </a:prstGeom>
+        </p:spPr>
+        <p:txBody>
+          <a:bodyPr>
+            <a:normAutofit/>
+          </a:bodyPr>
+          <a:lstStyle>
+            <a:lvl1pPr marL="228600" indent="-228600" algn="l" defTabSz="914400" rtl="0" eaLnBrk="1" latinLnBrk="0" hangingPunct="1">
+              <a:lnSpc>
+                <a:spcPct val="110000"/>
+              </a:lnSpc>
+              <a:spcBef>
+                <a:spcPts val="1000"/>
+              </a:spcBef>
+              <a:buClr>
+                <a:schemeClr val="accent5"/>
+              </a:buClr>
+              <a:buFont typeface="Avenir Next LT Pro" panose="020B0504020202020204" pitchFamily="34" charset="0"/>
+              <a:buChar char="+"/>
+              <a:defRPr sz="2800" kern="1200">
+                <a:solidFill>
+                  <a:schemeClr val="tx2"/>
+                </a:solidFill>
+                <a:latin typeface="+mn-lt"/>
+                <a:ea typeface="+mn-ea"/>
+                <a:cs typeface="+mn-cs"/>
+              </a:defRPr>
+            </a:lvl1pPr>
+            <a:lvl2pPr marL="685800" indent="-228600" algn="l" defTabSz="914400" rtl="0" eaLnBrk="1" latinLnBrk="0" hangingPunct="1">
+              <a:lnSpc>
+                <a:spcPct val="110000"/>
+              </a:lnSpc>
+              <a:spcBef>
+                <a:spcPts val="500"/>
+              </a:spcBef>
+              <a:buClr>
+                <a:schemeClr val="accent5"/>
+              </a:buClr>
+              <a:buFont typeface="Avenir Next LT Pro" panose="020B0504020202020204" pitchFamily="34" charset="0"/>
+              <a:buChar char="+"/>
+              <a:defRPr sz="2400" kern="1200">
+                <a:solidFill>
+                  <a:schemeClr val="tx2"/>
+                </a:solidFill>
+                <a:latin typeface="+mn-lt"/>
+                <a:ea typeface="+mn-ea"/>
+                <a:cs typeface="+mn-cs"/>
+              </a:defRPr>
+            </a:lvl2pPr>
+            <a:lvl3pPr marL="1143000" indent="-228600" algn="l" defTabSz="914400" rtl="0" eaLnBrk="1" latinLnBrk="0" hangingPunct="1">
+              <a:lnSpc>
+                <a:spcPct val="110000"/>
+              </a:lnSpc>
+              <a:spcBef>
+                <a:spcPts val="500"/>
+              </a:spcBef>
+              <a:buClr>
+                <a:schemeClr val="accent5"/>
+              </a:buClr>
+              <a:buFont typeface="Avenir Next LT Pro" panose="020B0504020202020204" pitchFamily="34" charset="0"/>
+              <a:buChar char="+"/>
+              <a:defRPr sz="2000" kern="1200">
+                <a:solidFill>
+                  <a:schemeClr val="tx2"/>
+                </a:solidFill>
+                <a:latin typeface="+mn-lt"/>
+                <a:ea typeface="+mn-ea"/>
+                <a:cs typeface="+mn-cs"/>
+              </a:defRPr>
+            </a:lvl3pPr>
+            <a:lvl4pPr marL="1600200" indent="-228600" algn="l" defTabSz="914400" rtl="0" eaLnBrk="1" latinLnBrk="0" hangingPunct="1">
+              <a:lnSpc>
+                <a:spcPct val="110000"/>
+              </a:lnSpc>
+              <a:spcBef>
+                <a:spcPts val="500"/>
+              </a:spcBef>
+              <a:buClr>
+                <a:schemeClr val="accent5"/>
+              </a:buClr>
+              <a:buFont typeface="Avenir Next LT Pro" panose="020B0504020202020204" pitchFamily="34" charset="0"/>
+              <a:buChar char="+"/>
+              <a:defRPr sz="1800" kern="1200">
+                <a:solidFill>
+                  <a:schemeClr val="tx2"/>
+                </a:solidFill>
+                <a:latin typeface="+mn-lt"/>
+                <a:ea typeface="+mn-ea"/>
+                <a:cs typeface="+mn-cs"/>
+              </a:defRPr>
+            </a:lvl4pPr>
+            <a:lvl5pPr marL="2057400" indent="-228600" algn="l" defTabSz="914400" rtl="0" eaLnBrk="1" latinLnBrk="0" hangingPunct="1">
+              <a:lnSpc>
+                <a:spcPct val="110000"/>
+              </a:lnSpc>
+              <a:spcBef>
+                <a:spcPts val="500"/>
+              </a:spcBef>
+              <a:buClr>
+                <a:schemeClr val="accent5"/>
+              </a:buClr>
+              <a:buFont typeface="Avenir Next LT Pro" panose="020B0504020202020204" pitchFamily="34" charset="0"/>
+              <a:buChar char="+"/>
+              <a:defRPr sz="1800" kern="1200">
+                <a:solidFill>
+                  <a:schemeClr val="tx2"/>
+                </a:solidFill>
+                <a:latin typeface="+mn-lt"/>
+                <a:ea typeface="+mn-ea"/>
+                <a:cs typeface="+mn-cs"/>
+              </a:defRPr>
+            </a:lvl5pPr>
+            <a:lvl6pPr marL="2514600" indent="-228600" algn="l" defTabSz="914400" rtl="0" eaLnBrk="1" latinLnBrk="0" hangingPunct="1">
+              <a:lnSpc>
+                <a:spcPct val="90000"/>
+              </a:lnSpc>
+              <a:spcBef>
+                <a:spcPts val="500"/>
+              </a:spcBef>
+              <a:buFont typeface="Arial" panose="020B0604020202020204" pitchFamily="34" charset="0"/>
+              <a:buChar char="•"/>
+              <a:defRPr sz="1800" kern="1200">
+                <a:solidFill>
+                  <a:schemeClr val="tx1"/>
+                </a:solidFill>
+                <a:latin typeface="+mn-lt"/>
+                <a:ea typeface="+mn-ea"/>
+                <a:cs typeface="+mn-cs"/>
+              </a:defRPr>
+            </a:lvl6pPr>
+            <a:lvl7pPr marL="2971800" indent="-228600" algn="l" defTabSz="914400" rtl="0" eaLnBrk="1" latinLnBrk="0" hangingPunct="1">
+              <a:lnSpc>
+                <a:spcPct val="90000"/>
+              </a:lnSpc>
+              <a:spcBef>
+                <a:spcPts val="500"/>
+              </a:spcBef>
+              <a:buFont typeface="Arial" panose="020B0604020202020204" pitchFamily="34" charset="0"/>
+              <a:buChar char="•"/>
+              <a:defRPr sz="1800" kern="1200">
+                <a:solidFill>
+                  <a:schemeClr val="tx1"/>
+                </a:solidFill>
+                <a:latin typeface="+mn-lt"/>
+                <a:ea typeface="+mn-ea"/>
+                <a:cs typeface="+mn-cs"/>
+              </a:defRPr>
+            </a:lvl7pPr>
+            <a:lvl8pPr marL="3429000" indent="-228600" algn="l" defTabSz="914400" rtl="0" eaLnBrk="1" latinLnBrk="0" hangingPunct="1">
+              <a:lnSpc>
+                <a:spcPct val="90000"/>
+              </a:lnSpc>
+              <a:spcBef>
+                <a:spcPts val="500"/>
+              </a:spcBef>
+              <a:buFont typeface="Arial" panose="020B0604020202020204" pitchFamily="34" charset="0"/>
+              <a:buChar char="•"/>
+              <a:defRPr sz="1800" kern="1200">
+                <a:solidFill>
+                  <a:schemeClr val="tx1"/>
+                </a:solidFill>
+                <a:latin typeface="+mn-lt"/>
+                <a:ea typeface="+mn-ea"/>
+                <a:cs typeface="+mn-cs"/>
+              </a:defRPr>
+            </a:lvl8pPr>
+            <a:lvl9pPr marL="3886200" indent="-228600" algn="l" defTabSz="914400" rtl="0" eaLnBrk="1" latinLnBrk="0" hangingPunct="1">
+              <a:lnSpc>
+                <a:spcPct val="90000"/>
+              </a:lnSpc>
+              <a:spcBef>
+                <a:spcPts val="500"/>
+              </a:spcBef>
+              <a:buFont typeface="Arial" panose="020B0604020202020204" pitchFamily="34" charset="0"/>
+              <a:buChar char="•"/>
+              <a:defRPr sz="1800" kern="1200">
+                <a:solidFill>
+                  <a:schemeClr val="tx1"/>
+                </a:solidFill>
+                <a:latin typeface="+mn-lt"/>
+                <a:ea typeface="+mn-ea"/>
+                <a:cs typeface="+mn-cs"/>
+              </a:defRPr>
+            </a:lvl9pPr>
+          </a:lstStyle>
+          <a:p>
+            <a:pPr>
+              <a:buFont typeface="Wingdings" panose="05000000000000000000" pitchFamily="2" charset="2"/>
+              <a:buChar char="§"/>
+            </a:pPr>
+            <a:r>
+              <a:rPr lang="en-US" dirty="0"/>
+              <a:t>Attempted to implement weighted forests.</a:t>
+            </a:r>
+          </a:p>
+          <a:p>
+            <a:pPr>
+              <a:buFont typeface="Wingdings" panose="05000000000000000000" pitchFamily="2" charset="2"/>
+              <a:buChar char="§"/>
+            </a:pPr>
+            <a:r>
+              <a:rPr lang="en-US" dirty="0"/>
+              <a:t>By calculating the OOB error of each tree</a:t>
+            </a:r>
+          </a:p>
+          <a:p>
+            <a:pPr>
+              <a:buFont typeface="Wingdings" panose="05000000000000000000" pitchFamily="2" charset="2"/>
+              <a:buChar char="§"/>
+            </a:pPr>
+            <a:r>
+              <a:rPr lang="en-US" dirty="0"/>
+              <a:t>Changing the structure of RF model</a:t>
+            </a:r>
+          </a:p>
+          <a:p>
+            <a:pPr>
+              <a:buFont typeface="Wingdings" panose="05000000000000000000" pitchFamily="2" charset="2"/>
+              <a:buChar char="§"/>
+            </a:pPr>
+            <a:endParaRPr lang="en-US" dirty="0"/>
+          </a:p>
+        </p:txBody>
+      </p:sp>
+    </p:spTree>
+    <p:extLst>
+      <p:ext uri="{BB962C8B-B14F-4D97-AF65-F5344CB8AC3E}">
+        <p14:creationId xmlns:p14="http://schemas.microsoft.com/office/powerpoint/2010/main" val="2355965566"/>
+      </p:ext>
+    </p:extLst>
+  </p:cSld>
+  <p:clrMapOvr>
+    <a:masterClrMapping/>
+  </p:clrMapOvr>
+</p:sld>
+</file>
+
+<file path=ppt/slides/slide18.xml><?xml version="1.0" encoding="utf-8"?>
+<p:sld xmlns:a="http://schemas.openxmlformats.org/drawingml/2006/main" xmlns:r="http://schemas.openxmlformats.org/officeDocument/2006/relationships" xmlns:p="http://schemas.openxmlformats.org/presentationml/2006/main">
+  <p:cSld>
+    <p:spTree>
+      <p:nvGrpSpPr>
+        <p:cNvPr id="1" name=""/>
+        <p:cNvGrpSpPr/>
+        <p:nvPr/>
+      </p:nvGrpSpPr>
+      <p:grpSpPr>
+        <a:xfrm>
+          <a:off x="0" y="0"/>
+          <a:ext cx="0" cy="0"/>
+          <a:chOff x="0" y="0"/>
+          <a:chExt cx="0" cy="0"/>
+        </a:xfrm>
+      </p:grpSpPr>
+      <p:sp>
+        <p:nvSpPr>
+          <p:cNvPr id="2" name="Title 1">
+            <a:extLst>
+              <a:ext uri="{FF2B5EF4-FFF2-40B4-BE49-F238E27FC236}">
                 <a16:creationId xmlns:a16="http://schemas.microsoft.com/office/drawing/2014/main" id="{97E37F4B-A10F-E16A-A412-33FB1CC3ED7A}"/>
               </a:ext>
             </a:extLst>
@@ -15292,7 +16684,7 @@
           <a:p>
             <a:fld id="{73B850FF-6169-4056-8077-06FFA93A5366}" type="slidenum">
               <a:rPr lang="en-US" smtClean="0"/>
-              <a:t>14</a:t>
+              <a:t>18</a:t>
             </a:fld>
             <a:endParaRPr lang="en-US"/>
           </a:p>
@@ -15311,7 +16703,7 @@
 </p:sld>
 </file>
 
-<file path=ppt/slides/slide15.xml><?xml version="1.0" encoding="utf-8"?>
+<file path=ppt/slides/slide19.xml><?xml version="1.0" encoding="utf-8"?>
 <p:sld xmlns:a="http://schemas.openxmlformats.org/drawingml/2006/main" xmlns:r="http://schemas.openxmlformats.org/officeDocument/2006/relationships" xmlns:p="http://schemas.openxmlformats.org/presentationml/2006/main">
   <p:cSld>
     <p:spTree>
@@ -15387,7 +16779,7 @@
           <a:p>
             <a:fld id="{73B850FF-6169-4056-8077-06FFA93A5366}" type="slidenum">
               <a:rPr lang="en-US" smtClean="0"/>
-              <a:t>15</a:t>
+              <a:t>19</a:t>
             </a:fld>
             <a:endParaRPr lang="en-US"/>
           </a:p>

</xml_diff>